<commit_message>
Updating Day 5 Powerpoint
</commit_message>
<xml_diff>
--- a/powerpoints/Roc_Day05 - Collections_Exceptions.pptx
+++ b/powerpoints/Roc_Day05 - Collections_Exceptions.pptx
@@ -29205,7 +29205,7 @@
             </a:pPr>
             <a:r>
               <a:rPr lang="en-US" b="1" dirty="0"/>
-              <a:t>Dequeue</a:t>
+              <a:t>Deque</a:t>
             </a:r>
           </a:p>
           <a:p>
@@ -31900,7 +31900,7 @@
             </a:pPr>
             <a:r>
               <a:rPr lang="en-US" sz="2220" dirty="0" err="1"/>
-              <a:t>someExampleVariableHasThisConvention</a:t>
+              <a:t>someExample</a:t>
             </a:r>
             <a:r>
               <a:rPr lang="en-US" sz="2220" dirty="0"/>

</xml_diff>